<commit_message>
Updated german translation of KDD.
</commit_message>
<xml_diff>
--- a/task-1/Fussenegger_Task1_RS1_SOSE13.presentation.pptx
+++ b/task-1/Fussenegger_Task1_RS1_SOSE13.presentation.pptx
@@ -3375,10 +3375,16 @@
               </a:lnSpc>
             </a:pPr>
             <a:r>
+              <a:rPr lang="de-AT" smtClean="0">
+                <a:latin typeface="Minion Pro" pitchFamily="18" charset="0"/>
+              </a:rPr>
+              <a:t>Wissensentdeckung </a:t>
+            </a:r>
+            <a:r>
               <a:rPr lang="de-AT" dirty="0" smtClean="0">
                 <a:latin typeface="Minion Pro" pitchFamily="18" charset="0"/>
               </a:rPr>
-              <a:t>Wissensfindung in Datenbanken</a:t>
+              <a:t>in Datenbanken</a:t>
             </a:r>
             <a:br>
               <a:rPr lang="de-AT" dirty="0" smtClean="0">
@@ -3759,8 +3765,8 @@
           </a:p>
         </p:txBody>
       </p:sp>
-      <mc:AlternateContent xmlns:mc="http://schemas.openxmlformats.org/markup-compatibility/2006">
-        <mc:Choice xmlns:a14="http://schemas.microsoft.com/office/drawing/2010/main" Requires="a14">
+      <mc:AlternateContent xmlns:mc="http://schemas.openxmlformats.org/markup-compatibility/2006" xmlns:a14="http://schemas.microsoft.com/office/drawing/2010/main">
+        <mc:Choice Requires="a14">
           <p:sp>
             <p:nvSpPr>
               <p:cNvPr id="3" name="Inhaltsplatzhalter 2"/>
@@ -3938,7 +3944,7 @@
             </p:txBody>
           </p:sp>
         </mc:Choice>
-        <mc:Fallback>
+        <mc:Fallback xmlns="">
           <p:sp>
             <p:nvSpPr>
               <p:cNvPr id="3" name="Inhaltsplatzhalter 2"/>
@@ -5118,7 +5124,7 @@
           </p:nvPr>
         </p:nvPicPr>
         <p:blipFill>
-          <a:blip r:embed="rId2">
+          <a:blip r:embed="rId2" cstate="print">
             <a:extLst>
               <a:ext uri="{28A0092B-C50C-407E-A947-70E740481C1C}">
                 <a14:useLocalDpi xmlns:a14="http://schemas.microsoft.com/office/drawing/2010/main" val="0"/>
@@ -5211,7 +5217,7 @@
           </p:nvPr>
         </p:nvPicPr>
         <p:blipFill>
-          <a:blip r:embed="rId2">
+          <a:blip r:embed="rId2" cstate="print">
             <a:extLst>
               <a:ext uri="{28A0092B-C50C-407E-A947-70E740481C1C}">
                 <a14:useLocalDpi xmlns:a14="http://schemas.microsoft.com/office/drawing/2010/main" val="0"/>

</xml_diff>